<commit_message>
updated topics with day4
</commit_message>
<xml_diff>
--- a/day2/Installation.pptx
+++ b/day2/Installation.pptx
@@ -2798,13 +2798,13 @@
               <a:rPr b="0" lang="en-US" sz="4400" spc="-1" strike="noStrike">
                 <a:latin typeface="Arial"/>
               </a:rPr>
-              <a:t>Click to edit the title </a:t>
+              <a:t>Click to edit the title text </a:t>
             </a:r>
             <a:r>
               <a:rPr b="0" lang="en-US" sz="4400" spc="-1" strike="noStrike">
                 <a:latin typeface="Arial"/>
               </a:rPr>
-              <a:t>text format</a:t>
+              <a:t>format</a:t>
             </a:r>
             <a:endParaRPr b="0" lang="en-US" sz="4400" spc="-1" strike="noStrike">
               <a:latin typeface="Arial"/>
@@ -3064,19 +3064,7 @@
               <a:rPr b="0" lang="en-US" sz="4400" spc="-1" strike="noStrike">
                 <a:latin typeface="Arial"/>
               </a:rPr>
-              <a:t>Click to edit </a:t>
-            </a:r>
-            <a:r>
-              <a:rPr b="0" lang="en-US" sz="4400" spc="-1" strike="noStrike">
-                <a:latin typeface="Arial"/>
-              </a:rPr>
-              <a:t>the title text </a:t>
-            </a:r>
-            <a:r>
-              <a:rPr b="0" lang="en-US" sz="4400" spc="-1" strike="noStrike">
-                <a:latin typeface="Arial"/>
-              </a:rPr>
-              <a:t>format</a:t>
+              <a:t>Click to edit the title text format</a:t>
             </a:r>
             <a:endParaRPr b="0" lang="en-US" sz="4400" spc="-1" strike="noStrike">
               <a:latin typeface="Arial"/>
@@ -3309,7 +3297,7 @@
         <p:spPr>
           <a:xfrm>
             <a:off x="611640" y="2441520"/>
-            <a:ext cx="7769880" cy="1467360"/>
+            <a:ext cx="7769520" cy="1467000"/>
           </a:xfrm>
           <a:prstGeom prst="rect">
             <a:avLst/>
@@ -3360,7 +3348,7 @@
         <p:spPr>
           <a:xfrm>
             <a:off x="155520" y="-144360"/>
-            <a:ext cx="302400" cy="302400"/>
+            <a:ext cx="302040" cy="302040"/>
           </a:xfrm>
           <a:prstGeom prst="rect">
             <a:avLst/>
@@ -3390,7 +3378,7 @@
         <p:spPr>
           <a:xfrm>
             <a:off x="155520" y="160200"/>
-            <a:ext cx="4773960" cy="1850760"/>
+            <a:ext cx="4773600" cy="1850400"/>
           </a:xfrm>
           <a:prstGeom prst="rect">
             <a:avLst/>
@@ -3409,7 +3397,7 @@
         <p:spPr>
           <a:xfrm>
             <a:off x="2468880" y="3910320"/>
-            <a:ext cx="2467440" cy="344880"/>
+            <a:ext cx="2467080" cy="344520"/>
           </a:xfrm>
           <a:prstGeom prst="rect">
             <a:avLst/>
@@ -3490,7 +3478,7 @@
         <p:spPr>
           <a:xfrm>
             <a:off x="914400" y="769320"/>
-            <a:ext cx="3474000" cy="601560"/>
+            <a:ext cx="3473640" cy="601200"/>
           </a:xfrm>
           <a:prstGeom prst="rect">
             <a:avLst/>
@@ -3557,7 +3545,7 @@
         <p:spPr>
           <a:xfrm>
             <a:off x="310680" y="1371960"/>
-            <a:ext cx="8594640" cy="3128040"/>
+            <a:ext cx="8594280" cy="3127680"/>
           </a:xfrm>
           <a:prstGeom prst="rect">
             <a:avLst/>
@@ -3576,7 +3564,7 @@
         <p:spPr>
           <a:xfrm>
             <a:off x="885960" y="5120640"/>
-            <a:ext cx="2679480" cy="345960"/>
+            <a:ext cx="2679120" cy="345600"/>
           </a:xfrm>
           <a:prstGeom prst="rect">
             <a:avLst/>
@@ -3657,7 +3645,7 @@
         <p:spPr>
           <a:xfrm>
             <a:off x="3478680" y="332640"/>
-            <a:ext cx="1986480" cy="637560"/>
+            <a:ext cx="1986120" cy="637200"/>
           </a:xfrm>
           <a:prstGeom prst="rect">
             <a:avLst/>
@@ -3687,7 +3675,7 @@
         <p:spPr>
           <a:xfrm>
             <a:off x="548640" y="3461760"/>
-            <a:ext cx="2856600" cy="2846880"/>
+            <a:ext cx="2856240" cy="2846520"/>
           </a:xfrm>
           <a:prstGeom prst="rect">
             <a:avLst/>
@@ -3710,7 +3698,7 @@
         <p:spPr>
           <a:xfrm>
             <a:off x="2980080" y="1308960"/>
-            <a:ext cx="3218400" cy="1418040"/>
+            <a:ext cx="3218040" cy="1417680"/>
           </a:xfrm>
           <a:prstGeom prst="rect">
             <a:avLst/>
@@ -3759,7 +3747,7 @@
         <p:spPr>
           <a:xfrm>
             <a:off x="365760" y="312120"/>
-            <a:ext cx="5835600" cy="601560"/>
+            <a:ext cx="5835240" cy="601200"/>
           </a:xfrm>
           <a:prstGeom prst="rect">
             <a:avLst/>
@@ -3826,7 +3814,7 @@
         <p:spPr>
           <a:xfrm>
             <a:off x="182880" y="1554480"/>
-            <a:ext cx="8686080" cy="3693240"/>
+            <a:ext cx="8685720" cy="3692880"/>
           </a:xfrm>
           <a:prstGeom prst="rect">
             <a:avLst/>
@@ -3875,7 +3863,7 @@
         <p:spPr>
           <a:xfrm>
             <a:off x="3478680" y="332640"/>
-            <a:ext cx="1986480" cy="637560"/>
+            <a:ext cx="1986120" cy="637200"/>
           </a:xfrm>
           <a:prstGeom prst="rect">
             <a:avLst/>
@@ -3905,7 +3893,7 @@
         <p:spPr>
           <a:xfrm>
             <a:off x="548640" y="3461760"/>
-            <a:ext cx="2856600" cy="2846880"/>
+            <a:ext cx="2856240" cy="2846520"/>
           </a:xfrm>
           <a:prstGeom prst="rect">
             <a:avLst/>
@@ -3928,7 +3916,7 @@
         <p:spPr>
           <a:xfrm>
             <a:off x="2743200" y="1737360"/>
-            <a:ext cx="3618360" cy="1256400"/>
+            <a:ext cx="3618000" cy="1256040"/>
           </a:xfrm>
           <a:prstGeom prst="rect">
             <a:avLst/>
@@ -3977,7 +3965,7 @@
         <p:spPr>
           <a:xfrm>
             <a:off x="731520" y="769320"/>
-            <a:ext cx="6478920" cy="857880"/>
+            <a:ext cx="6478560" cy="857520"/>
           </a:xfrm>
           <a:prstGeom prst="rect">
             <a:avLst/>
@@ -4005,7 +3993,11 @@
             </a:pPr>
             <a:r>
               <a:rPr b="0" lang="en-US" sz="1800" spc="-1" strike="noStrike">
+                <a:solidFill>
+                  <a:srgbClr val="000000"/>
+                </a:solidFill>
                 <a:latin typeface="Arial"/>
+                <a:ea typeface="DejaVu Sans"/>
               </a:rPr>
               <a:t>pip install pyspark</a:t>
             </a:r>
@@ -4048,7 +4040,7 @@
         <p:spPr>
           <a:xfrm>
             <a:off x="17640" y="1318320"/>
-            <a:ext cx="8851680" cy="967320"/>
+            <a:ext cx="8851320" cy="966960"/>
           </a:xfrm>
           <a:prstGeom prst="rect">
             <a:avLst/>
@@ -4071,7 +4063,7 @@
         <p:spPr>
           <a:xfrm>
             <a:off x="0" y="2377440"/>
-            <a:ext cx="9143280" cy="2801520"/>
+            <a:ext cx="9142920" cy="2801160"/>
           </a:xfrm>
           <a:prstGeom prst="rect">
             <a:avLst/>
@@ -4124,7 +4116,7 @@
         <p:spPr>
           <a:xfrm>
             <a:off x="174960" y="229320"/>
-            <a:ext cx="7779960" cy="6042600"/>
+            <a:ext cx="7779600" cy="6042240"/>
           </a:xfrm>
           <a:prstGeom prst="rect">
             <a:avLst/>
@@ -4173,7 +4165,7 @@
         <p:spPr>
           <a:xfrm>
             <a:off x="98280" y="182880"/>
-            <a:ext cx="7673760" cy="3929400"/>
+            <a:ext cx="7673400" cy="3929040"/>
           </a:xfrm>
           <a:prstGeom prst="rect">
             <a:avLst/>
@@ -4201,7 +4193,11 @@
             </a:pPr>
             <a:r>
               <a:rPr b="0" lang="en-US" sz="1800" spc="-1" strike="noStrike">
+                <a:solidFill>
+                  <a:srgbClr val="000000"/>
+                </a:solidFill>
                 <a:latin typeface="Arial"/>
+                <a:ea typeface="DejaVu Sans"/>
               </a:rPr>
               <a:t>import os</a:t>
             </a:r>
@@ -4217,7 +4213,11 @@
             </a:pPr>
             <a:r>
               <a:rPr b="0" lang="en-US" sz="1800" spc="-1" strike="noStrike">
+                <a:solidFill>
+                  <a:srgbClr val="000000"/>
+                </a:solidFill>
                 <a:latin typeface="Arial"/>
+                <a:ea typeface="DejaVu Sans"/>
               </a:rPr>
               <a:t>os.environ["JAVA_HOME"] = "/usr/lib/jvm/java-1.8.0-amazon-corretto"</a:t>
             </a:r>
@@ -4233,7 +4233,11 @@
             </a:pPr>
             <a:r>
               <a:rPr b="0" lang="en-US" sz="1800" spc="-1" strike="noStrike">
+                <a:solidFill>
+                  <a:srgbClr val="000000"/>
+                </a:solidFill>
                 <a:latin typeface="Arial"/>
+                <a:ea typeface="DejaVu Sans"/>
               </a:rPr>
               <a:t>os.environ["SPARK_HOME"] = "/home/aa100418/Desktop/spark-3.2.0-bin-hadoop2.7"</a:t>
             </a:r>
@@ -4259,7 +4263,11 @@
             </a:pPr>
             <a:r>
               <a:rPr b="0" lang="en-US" sz="1800" spc="-1" strike="noStrike">
+                <a:solidFill>
+                  <a:srgbClr val="000000"/>
+                </a:solidFill>
                 <a:latin typeface="Arial"/>
+                <a:ea typeface="DejaVu Sans"/>
               </a:rPr>
               <a:t>import findspark</a:t>
             </a:r>
@@ -4275,7 +4283,11 @@
             </a:pPr>
             <a:r>
               <a:rPr b="0" lang="en-US" sz="1800" spc="-1" strike="noStrike">
+                <a:solidFill>
+                  <a:srgbClr val="000000"/>
+                </a:solidFill>
                 <a:latin typeface="Arial"/>
+                <a:ea typeface="DejaVu Sans"/>
               </a:rPr>
               <a:t>findspark.init()</a:t>
             </a:r>
@@ -4301,7 +4313,11 @@
             </a:pPr>
             <a:r>
               <a:rPr b="0" lang="en-US" sz="1800" spc="-1" strike="noStrike">
+                <a:solidFill>
+                  <a:srgbClr val="000000"/>
+                </a:solidFill>
                 <a:latin typeface="Arial"/>
+                <a:ea typeface="DejaVu Sans"/>
               </a:rPr>
               <a:t>from pyspark import SparkContext, SparkConf</a:t>
             </a:r>
@@ -4327,7 +4343,11 @@
             </a:pPr>
             <a:r>
               <a:rPr b="0" lang="en-US" sz="1800" spc="-1" strike="noStrike">
+                <a:solidFill>
+                  <a:srgbClr val="000000"/>
+                </a:solidFill>
                 <a:latin typeface="Arial"/>
+                <a:ea typeface="DejaVu Sans"/>
               </a:rPr>
               <a:t>spark_conf = SparkConf()\</a:t>
             </a:r>
@@ -4343,13 +4363,21 @@
             </a:pPr>
             <a:r>
               <a:rPr b="0" lang="en-US" sz="1800" spc="-1" strike="noStrike">
+                <a:solidFill>
+                  <a:srgbClr val="000000"/>
+                </a:solidFill>
                 <a:latin typeface="Arial"/>
+                <a:ea typeface="DejaVu Sans"/>
               </a:rPr>
               <a:t>  </a:t>
             </a:r>
             <a:r>
               <a:rPr b="0" lang="en-US" sz="1800" spc="-1" strike="noStrike">
+                <a:solidFill>
+                  <a:srgbClr val="000000"/>
+                </a:solidFill>
                 <a:latin typeface="Arial"/>
+                <a:ea typeface="DejaVu Sans"/>
               </a:rPr>
               <a:t>.setAppName("YourTest")\</a:t>
             </a:r>
@@ -4365,13 +4393,21 @@
             </a:pPr>
             <a:r>
               <a:rPr b="0" lang="en-US" sz="1800" spc="-1" strike="noStrike">
+                <a:solidFill>
+                  <a:srgbClr val="000000"/>
+                </a:solidFill>
                 <a:latin typeface="Arial"/>
+                <a:ea typeface="DejaVu Sans"/>
               </a:rPr>
               <a:t>  </a:t>
             </a:r>
             <a:r>
               <a:rPr b="0" lang="en-US" sz="1800" spc="-1" strike="noStrike">
+                <a:solidFill>
+                  <a:srgbClr val="000000"/>
+                </a:solidFill>
                 <a:latin typeface="Arial"/>
+                <a:ea typeface="DejaVu Sans"/>
               </a:rPr>
               <a:t>.setMaster("local[*]")</a:t>
             </a:r>
@@ -4397,7 +4433,11 @@
             </a:pPr>
             <a:r>
               <a:rPr b="0" lang="en-US" sz="1800" spc="-1" strike="noStrike">
+                <a:solidFill>
+                  <a:srgbClr val="000000"/>
+                </a:solidFill>
                 <a:latin typeface="Arial"/>
+                <a:ea typeface="DejaVu Sans"/>
               </a:rPr>
               <a:t>spark = SparkContext.getOrCreate(spark_conf)</a:t>
             </a:r>
@@ -4420,7 +4460,7 @@
         <p:spPr>
           <a:xfrm>
             <a:off x="91440" y="4112640"/>
-            <a:ext cx="7772040" cy="2706480"/>
+            <a:ext cx="7771680" cy="2706120"/>
           </a:xfrm>
           <a:prstGeom prst="rect">
             <a:avLst/>
@@ -4473,7 +4513,7 @@
         <p:spPr>
           <a:xfrm>
             <a:off x="162720" y="1554480"/>
-            <a:ext cx="8981280" cy="4020840"/>
+            <a:ext cx="8980920" cy="4020480"/>
           </a:xfrm>
           <a:prstGeom prst="rect">
             <a:avLst/>
@@ -4485,14 +4525,14 @@
       </p:pic>
       <p:sp>
         <p:nvSpPr>
-          <p:cNvPr id="118" name="TextShape 1"/>
-          <p:cNvSpPr txBox="1"/>
+          <p:cNvPr id="118" name="CustomShape 1"/>
+          <p:cNvSpPr/>
           <p:nvPr/>
         </p:nvSpPr>
         <p:spPr>
           <a:xfrm>
             <a:off x="1280160" y="365760"/>
-            <a:ext cx="6054120" cy="346320"/>
+            <a:ext cx="6053760" cy="345960"/>
           </a:xfrm>
           <a:prstGeom prst="rect">
             <a:avLst/>
@@ -4502,11 +4542,22 @@
             <a:noFill/>
           </a:ln>
         </p:spPr>
+        <p:style>
+          <a:lnRef idx="0"/>
+          <a:fillRef idx="0"/>
+          <a:effectRef idx="0"/>
+          <a:fontRef idx="minor"/>
+        </p:style>
         <p:txBody>
           <a:bodyPr lIns="90000" rIns="90000" tIns="45000" bIns="45000">
             <a:noAutofit/>
           </a:bodyPr>
           <a:p>
+            <a:pPr>
+              <a:lnSpc>
+                <a:spcPct val="100000"/>
+              </a:lnSpc>
+            </a:pPr>
             <a:r>
               <a:rPr b="0" lang="en-US" sz="1800" spc="-1" strike="noStrike">
                 <a:latin typeface="Arial"/>
@@ -4558,7 +4609,7 @@
         <p:spPr>
           <a:xfrm>
             <a:off x="2194560" y="1616040"/>
-            <a:ext cx="4571280" cy="2955240"/>
+            <a:ext cx="4570920" cy="2954880"/>
           </a:xfrm>
           <a:prstGeom prst="rect">
             <a:avLst/>
@@ -4953,7 +5004,7 @@
         <p:spPr>
           <a:xfrm>
             <a:off x="276480" y="182880"/>
-            <a:ext cx="8226720" cy="6540120"/>
+            <a:ext cx="8226360" cy="6539760"/>
           </a:xfrm>
           <a:prstGeom prst="rect">
             <a:avLst/>
@@ -5002,7 +5053,7 @@
         <p:spPr>
           <a:xfrm>
             <a:off x="3478680" y="332640"/>
-            <a:ext cx="1986480" cy="637560"/>
+            <a:ext cx="1986120" cy="637200"/>
           </a:xfrm>
           <a:prstGeom prst="rect">
             <a:avLst/>
@@ -5032,7 +5083,7 @@
         <p:spPr>
           <a:xfrm>
             <a:off x="548640" y="3461760"/>
-            <a:ext cx="2856600" cy="2846880"/>
+            <a:ext cx="2856240" cy="2846520"/>
           </a:xfrm>
           <a:prstGeom prst="rect">
             <a:avLst/>
@@ -5055,7 +5106,7 @@
         <p:spPr>
           <a:xfrm>
             <a:off x="2651760" y="1645920"/>
-            <a:ext cx="3932640" cy="1161000"/>
+            <a:ext cx="3932280" cy="1160640"/>
           </a:xfrm>
           <a:prstGeom prst="rect">
             <a:avLst/>
@@ -5215,7 +5266,7 @@
         <p:spPr>
           <a:xfrm>
             <a:off x="133200" y="312120"/>
-            <a:ext cx="5535360" cy="1113480"/>
+            <a:ext cx="5535000" cy="1113120"/>
           </a:xfrm>
           <a:prstGeom prst="rect">
             <a:avLst/>
@@ -5314,7 +5365,7 @@
         <p:spPr>
           <a:xfrm>
             <a:off x="74160" y="1712160"/>
-            <a:ext cx="8337600" cy="3864960"/>
+            <a:ext cx="8337240" cy="3864600"/>
           </a:xfrm>
           <a:prstGeom prst="rect">
             <a:avLst/>
@@ -5363,7 +5414,7 @@
         <p:spPr>
           <a:xfrm>
             <a:off x="274320" y="731520"/>
-            <a:ext cx="1310760" cy="345600"/>
+            <a:ext cx="1310400" cy="345240"/>
           </a:xfrm>
           <a:prstGeom prst="rect">
             <a:avLst/>
@@ -5418,7 +5469,7 @@
         <p:spPr>
           <a:xfrm>
             <a:off x="91440" y="1339560"/>
-            <a:ext cx="8968320" cy="4694760"/>
+            <a:ext cx="8967960" cy="4694400"/>
           </a:xfrm>
           <a:prstGeom prst="rect">
             <a:avLst/>
@@ -5467,7 +5518,7 @@
         <p:spPr>
           <a:xfrm>
             <a:off x="3478680" y="332640"/>
-            <a:ext cx="1986480" cy="637560"/>
+            <a:ext cx="1986120" cy="637200"/>
           </a:xfrm>
           <a:prstGeom prst="rect">
             <a:avLst/>
@@ -5497,7 +5548,7 @@
         <p:spPr>
           <a:xfrm>
             <a:off x="548640" y="3461760"/>
-            <a:ext cx="2856600" cy="2846880"/>
+            <a:ext cx="2856240" cy="2846520"/>
           </a:xfrm>
           <a:prstGeom prst="rect">
             <a:avLst/>
@@ -5520,7 +5571,7 @@
         <p:spPr>
           <a:xfrm>
             <a:off x="3240720" y="1005840"/>
-            <a:ext cx="4256640" cy="2122920"/>
+            <a:ext cx="4256280" cy="2122560"/>
           </a:xfrm>
           <a:prstGeom prst="rect">
             <a:avLst/>
@@ -5569,7 +5620,7 @@
         <p:spPr>
           <a:xfrm>
             <a:off x="408960" y="495000"/>
-            <a:ext cx="7637040" cy="601560"/>
+            <a:ext cx="7636680" cy="601200"/>
           </a:xfrm>
           <a:prstGeom prst="rect">
             <a:avLst/>
@@ -5636,7 +5687,7 @@
         <p:spPr>
           <a:xfrm>
             <a:off x="548640" y="1280160"/>
-            <a:ext cx="7040160" cy="3769560"/>
+            <a:ext cx="7039800" cy="3769200"/>
           </a:xfrm>
           <a:prstGeom prst="rect">
             <a:avLst/>
@@ -5689,7 +5740,7 @@
         <p:spPr>
           <a:xfrm>
             <a:off x="165600" y="491760"/>
-            <a:ext cx="8794800" cy="5725440"/>
+            <a:ext cx="8794440" cy="5725080"/>
           </a:xfrm>
           <a:prstGeom prst="rect">
             <a:avLst/>
@@ -5738,7 +5789,7 @@
         <p:spPr>
           <a:xfrm>
             <a:off x="3478680" y="332640"/>
-            <a:ext cx="1986480" cy="637560"/>
+            <a:ext cx="1986120" cy="637200"/>
           </a:xfrm>
           <a:prstGeom prst="rect">
             <a:avLst/>
@@ -5768,7 +5819,7 @@
         <p:spPr>
           <a:xfrm>
             <a:off x="548640" y="3461760"/>
-            <a:ext cx="2856600" cy="2846880"/>
+            <a:ext cx="2856240" cy="2846520"/>
           </a:xfrm>
           <a:prstGeom prst="rect">
             <a:avLst/>
@@ -5791,7 +5842,7 @@
         <p:spPr>
           <a:xfrm>
             <a:off x="3688560" y="1261440"/>
-            <a:ext cx="1980000" cy="2304000"/>
+            <a:ext cx="1979640" cy="2303640"/>
           </a:xfrm>
           <a:prstGeom prst="rect">
             <a:avLst/>
@@ -5840,7 +5891,7 @@
         <p:spPr>
           <a:xfrm>
             <a:off x="133200" y="274320"/>
-            <a:ext cx="1878120" cy="345960"/>
+            <a:ext cx="1877760" cy="345600"/>
           </a:xfrm>
           <a:prstGeom prst="rect">
             <a:avLst/>
@@ -5868,7 +5919,11 @@
             </a:pPr>
             <a:r>
               <a:rPr b="0" lang="en-US" sz="1800" spc="-1" strike="noStrike">
+                <a:solidFill>
+                  <a:srgbClr val="000000"/>
+                </a:solidFill>
                 <a:latin typeface="Arial"/>
+                <a:ea typeface="DejaVu Sans"/>
               </a:rPr>
               <a:t>pip install jupyter</a:t>
             </a:r>
@@ -5891,7 +5946,7 @@
         <p:spPr>
           <a:xfrm>
             <a:off x="109080" y="801720"/>
-            <a:ext cx="8851680" cy="1849680"/>
+            <a:ext cx="8851320" cy="1849320"/>
           </a:xfrm>
           <a:prstGeom prst="rect">
             <a:avLst/>
@@ -5910,7 +5965,7 @@
         <p:spPr>
           <a:xfrm>
             <a:off x="145440" y="2945520"/>
-            <a:ext cx="1865880" cy="345960"/>
+            <a:ext cx="1865520" cy="345600"/>
           </a:xfrm>
           <a:prstGeom prst="rect">
             <a:avLst/>
@@ -5938,7 +5993,11 @@
             </a:pPr>
             <a:r>
               <a:rPr b="0" lang="en-US" sz="1800" spc="-1" strike="noStrike">
+                <a:solidFill>
+                  <a:srgbClr val="000000"/>
+                </a:solidFill>
                 <a:latin typeface="Arial"/>
+                <a:ea typeface="DejaVu Sans"/>
               </a:rPr>
               <a:t>jupyter notebook</a:t>
             </a:r>
@@ -5961,7 +6020,7 @@
         <p:spPr>
           <a:xfrm>
             <a:off x="91440" y="3890880"/>
-            <a:ext cx="8960400" cy="2472480"/>
+            <a:ext cx="8960040" cy="2472120"/>
           </a:xfrm>
           <a:prstGeom prst="rect">
             <a:avLst/>

</xml_diff>